<commit_message>
SlideSet2PPTX works from command line
</commit_message>
<xml_diff>
--- a/toolkit_plugins/org.slidinator.pptx/resources/pptx/generic-presentation.pptx
+++ b/toolkit_plugins/org.slidinator.pptx/resources/pptx/generic-presentation.pptx
@@ -288,7 +288,7 @@
           <a:p>
             <a:fld id="{80463D50-06A0-C94D-A16A-D85804E22570}" type="datetimeFigureOut">
               <a:rPr lang="en-US" smtClean="0"/>
-              <a:t>9/29/14</a:t>
+              <a:t>9/30/14</a:t>
             </a:fld>
             <a:endParaRPr lang="en-US"/>
           </a:p>
@@ -458,7 +458,7 @@
           <a:p>
             <a:fld id="{80463D50-06A0-C94D-A16A-D85804E22570}" type="datetimeFigureOut">
               <a:rPr lang="en-US" smtClean="0"/>
-              <a:t>9/29/14</a:t>
+              <a:t>9/30/14</a:t>
             </a:fld>
             <a:endParaRPr lang="en-US"/>
           </a:p>
@@ -638,7 +638,7 @@
           <a:p>
             <a:fld id="{80463D50-06A0-C94D-A16A-D85804E22570}" type="datetimeFigureOut">
               <a:rPr lang="en-US" smtClean="0"/>
-              <a:t>9/29/14</a:t>
+              <a:t>9/30/14</a:t>
             </a:fld>
             <a:endParaRPr lang="en-US"/>
           </a:p>
@@ -808,7 +808,7 @@
           <a:p>
             <a:fld id="{80463D50-06A0-C94D-A16A-D85804E22570}" type="datetimeFigureOut">
               <a:rPr lang="en-US" smtClean="0"/>
-              <a:t>9/29/14</a:t>
+              <a:t>9/30/14</a:t>
             </a:fld>
             <a:endParaRPr lang="en-US"/>
           </a:p>
@@ -1054,7 +1054,7 @@
           <a:p>
             <a:fld id="{80463D50-06A0-C94D-A16A-D85804E22570}" type="datetimeFigureOut">
               <a:rPr lang="en-US" smtClean="0"/>
-              <a:t>9/29/14</a:t>
+              <a:t>9/30/14</a:t>
             </a:fld>
             <a:endParaRPr lang="en-US"/>
           </a:p>
@@ -1342,7 +1342,7 @@
           <a:p>
             <a:fld id="{80463D50-06A0-C94D-A16A-D85804E22570}" type="datetimeFigureOut">
               <a:rPr lang="en-US" smtClean="0"/>
-              <a:t>9/29/14</a:t>
+              <a:t>9/30/14</a:t>
             </a:fld>
             <a:endParaRPr lang="en-US"/>
           </a:p>
@@ -1764,7 +1764,7 @@
           <a:p>
             <a:fld id="{80463D50-06A0-C94D-A16A-D85804E22570}" type="datetimeFigureOut">
               <a:rPr lang="en-US" smtClean="0"/>
-              <a:t>9/29/14</a:t>
+              <a:t>9/30/14</a:t>
             </a:fld>
             <a:endParaRPr lang="en-US"/>
           </a:p>
@@ -1882,7 +1882,7 @@
           <a:p>
             <a:fld id="{80463D50-06A0-C94D-A16A-D85804E22570}" type="datetimeFigureOut">
               <a:rPr lang="en-US" smtClean="0"/>
-              <a:t>9/29/14</a:t>
+              <a:t>9/30/14</a:t>
             </a:fld>
             <a:endParaRPr lang="en-US"/>
           </a:p>
@@ -1977,7 +1977,7 @@
           <a:p>
             <a:fld id="{80463D50-06A0-C94D-A16A-D85804E22570}" type="datetimeFigureOut">
               <a:rPr lang="en-US" smtClean="0"/>
-              <a:t>9/29/14</a:t>
+              <a:t>9/30/14</a:t>
             </a:fld>
             <a:endParaRPr lang="en-US"/>
           </a:p>
@@ -2254,7 +2254,7 @@
           <a:p>
             <a:fld id="{80463D50-06A0-C94D-A16A-D85804E22570}" type="datetimeFigureOut">
               <a:rPr lang="en-US" smtClean="0"/>
-              <a:t>9/29/14</a:t>
+              <a:t>9/30/14</a:t>
             </a:fld>
             <a:endParaRPr lang="en-US"/>
           </a:p>
@@ -2507,7 +2507,7 @@
           <a:p>
             <a:fld id="{80463D50-06A0-C94D-A16A-D85804E22570}" type="datetimeFigureOut">
               <a:rPr lang="en-US" smtClean="0"/>
-              <a:t>9/29/14</a:t>
+              <a:t>9/30/14</a:t>
             </a:fld>
             <a:endParaRPr lang="en-US"/>
           </a:p>
@@ -2720,7 +2720,7 @@
           <a:p>
             <a:fld id="{80463D50-06A0-C94D-A16A-D85804E22570}" type="datetimeFigureOut">
               <a:rPr lang="en-US" smtClean="0"/>
-              <a:t>9/29/14</a:t>
+              <a:t>9/30/14</a:t>
             </a:fld>
             <a:endParaRPr lang="en-US"/>
           </a:p>

</xml_diff>